<commit_message>
Final Document Update (sans readme)
</commit_message>
<xml_diff>
--- a/Heart_Disease_Model_Presentation.pptx
+++ b/Heart_Disease_Model_Presentation.pptx
@@ -155,7 +155,7 @@
 <file path=ppt/revisionInfo.xml><?xml version="1.0" encoding="utf-8"?>
 <p1510:revInfo xmlns:a="http://schemas.openxmlformats.org/drawingml/2006/main" xmlns:r="http://schemas.openxmlformats.org/officeDocument/2006/relationships" xmlns:p1510="http://schemas.microsoft.com/office/powerpoint/2015/10/main">
   <p1510:revLst>
-    <p1510:client id="{C4827902-F3BB-44F7-AFAD-CFCA99A28693}" v="93" dt="2025-04-21T23:13:16.691"/>
+    <p1510:client id="{C4827902-F3BB-44F7-AFAD-CFCA99A28693}" v="94" dt="2025-04-22T00:20:39.931"/>
   </p1510:revLst>
 </p1510:revInfo>
 </file>
@@ -165,7 +165,7 @@
   <pc:docChgLst>
     <pc:chgData name="Andrea Hazzard" userId="f8d997080a0a13a9" providerId="LiveId" clId="{C4827902-F3BB-44F7-AFAD-CFCA99A28693}"/>
     <pc:docChg chg="undo custSel addSld delSld modSld sldOrd">
-      <pc:chgData name="Andrea Hazzard" userId="f8d997080a0a13a9" providerId="LiveId" clId="{C4827902-F3BB-44F7-AFAD-CFCA99A28693}" dt="2025-04-21T23:13:16.691" v="6413"/>
+      <pc:chgData name="Andrea Hazzard" userId="f8d997080a0a13a9" providerId="LiveId" clId="{C4827902-F3BB-44F7-AFAD-CFCA99A28693}" dt="2025-04-22T00:25:43.040" v="6739" actId="6549"/>
       <pc:docMkLst>
         <pc:docMk/>
       </pc:docMkLst>
@@ -213,7 +213,7 @@
         </pc:graphicFrameChg>
       </pc:sldChg>
       <pc:sldChg chg="ord modNotesTx">
-        <pc:chgData name="Andrea Hazzard" userId="f8d997080a0a13a9" providerId="LiveId" clId="{C4827902-F3BB-44F7-AFAD-CFCA99A28693}" dt="2025-04-21T22:51:11.888" v="6053" actId="20577"/>
+        <pc:chgData name="Andrea Hazzard" userId="f8d997080a0a13a9" providerId="LiveId" clId="{C4827902-F3BB-44F7-AFAD-CFCA99A28693}" dt="2025-04-21T23:26:06.255" v="6427" actId="20577"/>
         <pc:sldMkLst>
           <pc:docMk/>
           <pc:sldMk cId="0" sldId="261"/>
@@ -397,13 +397,13 @@
         </pc:picChg>
       </pc:sldChg>
       <pc:sldChg chg="addSp modSp mod modNotesTx">
-        <pc:chgData name="Andrea Hazzard" userId="f8d997080a0a13a9" providerId="LiveId" clId="{C4827902-F3BB-44F7-AFAD-CFCA99A28693}" dt="2025-04-21T22:51:41.852" v="6086" actId="20577"/>
+        <pc:chgData name="Andrea Hazzard" userId="f8d997080a0a13a9" providerId="LiveId" clId="{C4827902-F3BB-44F7-AFAD-CFCA99A28693}" dt="2025-04-22T00:25:43.040" v="6739" actId="6549"/>
         <pc:sldMkLst>
           <pc:docMk/>
           <pc:sldMk cId="0" sldId="270"/>
         </pc:sldMkLst>
         <pc:spChg chg="add mod">
-          <ac:chgData name="Andrea Hazzard" userId="f8d997080a0a13a9" providerId="LiveId" clId="{C4827902-F3BB-44F7-AFAD-CFCA99A28693}" dt="2025-04-17T22:10:28.488" v="338" actId="1076"/>
+          <ac:chgData name="Andrea Hazzard" userId="f8d997080a0a13a9" providerId="LiveId" clId="{C4827902-F3BB-44F7-AFAD-CFCA99A28693}" dt="2025-04-22T00:15:34.667" v="6515" actId="1036"/>
           <ac:spMkLst>
             <pc:docMk/>
             <pc:sldMk cId="0" sldId="270"/>
@@ -411,7 +411,7 @@
           </ac:spMkLst>
         </pc:spChg>
         <pc:spChg chg="add mod">
-          <ac:chgData name="Andrea Hazzard" userId="f8d997080a0a13a9" providerId="LiveId" clId="{C4827902-F3BB-44F7-AFAD-CFCA99A28693}" dt="2025-04-17T22:12:01.895" v="345" actId="1076"/>
+          <ac:chgData name="Andrea Hazzard" userId="f8d997080a0a13a9" providerId="LiveId" clId="{C4827902-F3BB-44F7-AFAD-CFCA99A28693}" dt="2025-04-22T00:15:35.275" v="6516" actId="1036"/>
           <ac:spMkLst>
             <pc:docMk/>
             <pc:sldMk cId="0" sldId="270"/>
@@ -419,7 +419,7 @@
           </ac:spMkLst>
         </pc:spChg>
         <pc:spChg chg="add mod">
-          <ac:chgData name="Andrea Hazzard" userId="f8d997080a0a13a9" providerId="LiveId" clId="{C4827902-F3BB-44F7-AFAD-CFCA99A28693}" dt="2025-04-17T22:12:30.951" v="362" actId="20577"/>
+          <ac:chgData name="Andrea Hazzard" userId="f8d997080a0a13a9" providerId="LiveId" clId="{C4827902-F3BB-44F7-AFAD-CFCA99A28693}" dt="2025-04-22T00:15:35.885" v="6517" actId="1036"/>
           <ac:spMkLst>
             <pc:docMk/>
             <pc:sldMk cId="0" sldId="270"/>
@@ -427,7 +427,7 @@
           </ac:spMkLst>
         </pc:spChg>
         <pc:spChg chg="add mod">
-          <ac:chgData name="Andrea Hazzard" userId="f8d997080a0a13a9" providerId="LiveId" clId="{C4827902-F3BB-44F7-AFAD-CFCA99A28693}" dt="2025-04-17T22:12:55.479" v="382" actId="20577"/>
+          <ac:chgData name="Andrea Hazzard" userId="f8d997080a0a13a9" providerId="LiveId" clId="{C4827902-F3BB-44F7-AFAD-CFCA99A28693}" dt="2025-04-22T00:15:36.459" v="6518" actId="1036"/>
           <ac:spMkLst>
             <pc:docMk/>
             <pc:sldMk cId="0" sldId="270"/>
@@ -435,7 +435,7 @@
           </ac:spMkLst>
         </pc:spChg>
         <pc:spChg chg="add mod">
-          <ac:chgData name="Andrea Hazzard" userId="f8d997080a0a13a9" providerId="LiveId" clId="{C4827902-F3BB-44F7-AFAD-CFCA99A28693}" dt="2025-04-17T22:14:14.106" v="417" actId="1038"/>
+          <ac:chgData name="Andrea Hazzard" userId="f8d997080a0a13a9" providerId="LiveId" clId="{C4827902-F3BB-44F7-AFAD-CFCA99A28693}" dt="2025-04-22T00:15:34.135" v="6514" actId="1076"/>
           <ac:spMkLst>
             <pc:docMk/>
             <pc:sldMk cId="0" sldId="270"/>
@@ -1155,14 +1155,6 @@
             <ac:spMk id="2" creationId="{8EE18162-764F-5A2E-11FF-CF4A75FE1C7E}"/>
           </ac:spMkLst>
         </pc:spChg>
-        <pc:spChg chg="del">
-          <ac:chgData name="Andrea Hazzard" userId="f8d997080a0a13a9" providerId="LiveId" clId="{C4827902-F3BB-44F7-AFAD-CFCA99A28693}" dt="2025-04-20T23:18:49.420" v="2634"/>
-          <ac:spMkLst>
-            <pc:docMk/>
-            <pc:sldMk cId="110132295" sldId="285"/>
-            <ac:spMk id="3" creationId="{389BCA87-971B-0106-AA79-455A46379994}"/>
-          </ac:spMkLst>
-        </pc:spChg>
         <pc:spChg chg="add">
           <ac:chgData name="Andrea Hazzard" userId="f8d997080a0a13a9" providerId="LiveId" clId="{C4827902-F3BB-44F7-AFAD-CFCA99A28693}" dt="2025-04-20T23:19:43.562" v="2677" actId="26606"/>
           <ac:spMkLst>
@@ -1192,14 +1184,6 @@
             <pc:docMk/>
             <pc:sldMk cId="1597439251" sldId="286"/>
             <ac:spMk id="2" creationId="{13BC1F5F-9850-D2CC-A0AC-9772407C00EE}"/>
-          </ac:spMkLst>
-        </pc:spChg>
-        <pc:spChg chg="del mod">
-          <ac:chgData name="Andrea Hazzard" userId="f8d997080a0a13a9" providerId="LiveId" clId="{C4827902-F3BB-44F7-AFAD-CFCA99A28693}" dt="2025-04-20T23:41:13.138" v="2745" actId="26606"/>
-          <ac:spMkLst>
-            <pc:docMk/>
-            <pc:sldMk cId="1597439251" sldId="286"/>
-            <ac:spMk id="3" creationId="{DC1B286A-A754-263A-D53E-4D1359686B48}"/>
           </ac:spMkLst>
         </pc:spChg>
         <pc:spChg chg="add">
@@ -1273,22 +1257,6 @@
             <ac:spMk id="2" creationId="{EE244C87-3D7E-8DC2-EF08-96DA148B51D9}"/>
           </ac:spMkLst>
         </pc:spChg>
-        <pc:spChg chg="del">
-          <ac:chgData name="Andrea Hazzard" userId="f8d997080a0a13a9" providerId="LiveId" clId="{C4827902-F3BB-44F7-AFAD-CFCA99A28693}" dt="2025-04-20T23:43:15.292" v="2778" actId="478"/>
-          <ac:spMkLst>
-            <pc:docMk/>
-            <pc:sldMk cId="2797517382" sldId="287"/>
-            <ac:spMk id="3" creationId="{DBEFF6A9-B343-0BBF-35DF-10C4B7AB24C2}"/>
-          </ac:spMkLst>
-        </pc:spChg>
-        <pc:spChg chg="add del mod">
-          <ac:chgData name="Andrea Hazzard" userId="f8d997080a0a13a9" providerId="LiveId" clId="{C4827902-F3BB-44F7-AFAD-CFCA99A28693}" dt="2025-04-20T23:56:41.929" v="3890" actId="21"/>
-          <ac:spMkLst>
-            <pc:docMk/>
-            <pc:sldMk cId="2797517382" sldId="287"/>
-            <ac:spMk id="8" creationId="{EBFB06D8-C54E-088C-894E-DEA27E7F11FE}"/>
-          </ac:spMkLst>
-        </pc:spChg>
         <pc:spChg chg="add mod">
           <ac:chgData name="Andrea Hazzard" userId="f8d997080a0a13a9" providerId="LiveId" clId="{C4827902-F3BB-44F7-AFAD-CFCA99A28693}" dt="2025-04-20T23:57:56.928" v="3901" actId="1036"/>
           <ac:spMkLst>
@@ -1329,14 +1297,6 @@
             <ac:spMk id="18" creationId="{E37EECFC-A684-4391-AE85-4CDAF5565F61}"/>
           </ac:spMkLst>
         </pc:spChg>
-        <pc:picChg chg="add del">
-          <ac:chgData name="Andrea Hazzard" userId="f8d997080a0a13a9" providerId="LiveId" clId="{C4827902-F3BB-44F7-AFAD-CFCA99A28693}" dt="2025-04-20T23:43:12.275" v="2777" actId="22"/>
-          <ac:picMkLst>
-            <pc:docMk/>
-            <pc:sldMk cId="2797517382" sldId="287"/>
-            <ac:picMk id="5" creationId="{FA034571-A538-7050-184D-75529A626E38}"/>
-          </ac:picMkLst>
-        </pc:picChg>
         <pc:picChg chg="add mod">
           <ac:chgData name="Andrea Hazzard" userId="f8d997080a0a13a9" providerId="LiveId" clId="{C4827902-F3BB-44F7-AFAD-CFCA99A28693}" dt="2025-04-20T23:58:31.847" v="3904" actId="1076"/>
           <ac:picMkLst>
@@ -1347,7 +1307,7 @@
         </pc:picChg>
       </pc:sldChg>
       <pc:sldChg chg="addSp delSp modSp add mod modAnim modNotesTx">
-        <pc:chgData name="Andrea Hazzard" userId="f8d997080a0a13a9" providerId="LiveId" clId="{C4827902-F3BB-44F7-AFAD-CFCA99A28693}" dt="2025-04-21T23:13:16.691" v="6413"/>
+        <pc:chgData name="Andrea Hazzard" userId="f8d997080a0a13a9" providerId="LiveId" clId="{C4827902-F3BB-44F7-AFAD-CFCA99A28693}" dt="2025-04-21T23:49:26.778" v="6429" actId="20577"/>
         <pc:sldMkLst>
           <pc:docMk/>
           <pc:sldMk cId="523526661" sldId="288"/>
@@ -22283,7 +22243,15 @@
           <a:p>
             <a:r>
               <a:rPr dirty="0"/>
-              <a:t>Predictions were saved to SQLite and exported to CSV for Tableau. This enabled deeper exploration of results and model performance.</a:t>
+              <a:t>Predictions were saved to SQLite and exported to CSV</a:t>
+            </a:r>
+            <a:r>
+              <a:rPr lang="en-US" dirty="0"/>
+              <a:t>.</a:t>
+            </a:r>
+            <a:r>
+              <a:rPr dirty="0"/>
+              <a:t> This enabled deeper exploration of results and model performance.</a:t>
             </a:r>
           </a:p>
         </p:txBody>
@@ -22617,8 +22585,23 @@
           </a:p>
           <a:p>
             <a:r>
+              <a:rPr lang="en-US" dirty="0"/>
+              <a:t>Here is where it gets interesting. Those with no chest pain symptoms </a:t>
+            </a:r>
+            <a:r>
               <a:rPr dirty="0"/>
-              <a:t>Patients reporting typical angina or asymptomatic chest pain are more likely to have heart disease. Those with non-anginal pain are more likely in the negative group.</a:t>
+              <a:t>are more likely to have heart disease</a:t>
+            </a:r>
+            <a:r>
+              <a:rPr lang="en-US" dirty="0"/>
+              <a:t> than those with chest </a:t>
+            </a:r>
+            <a:r>
+              <a:rPr lang="en-US"/>
+              <a:t>pain</a:t>
+            </a:r>
+            <a:r>
+              <a:t>.</a:t>
             </a:r>
             <a:endParaRPr lang="en-US" dirty="0"/>
           </a:p>
@@ -22672,6 +22655,49 @@
               <a:t>nitroglycerin</a:t>
             </a:r>
             <a:endParaRPr lang="en-US" dirty="0"/>
+          </a:p>
+          <a:p>
+            <a:endParaRPr lang="en-US" dirty="0"/>
+          </a:p>
+          <a:p>
+            <a:r>
+              <a:rPr lang="en-US" dirty="0"/>
+              <a:t>Patients labeled as "asymptomatic" often turn out to have </a:t>
+            </a:r>
+            <a:r>
+              <a:rPr lang="en-US" b="1" dirty="0"/>
+              <a:t>higher rates of significant heart disease</a:t>
+            </a:r>
+            <a:r>
+              <a:rPr lang="en-US" dirty="0"/>
+              <a:t>, because:</a:t>
+            </a:r>
+          </a:p>
+          <a:p>
+            <a:r>
+              <a:rPr lang="en-US" dirty="0"/>
+              <a:t>Their condition may go unnoticed longer,</a:t>
+            </a:r>
+          </a:p>
+          <a:p>
+            <a:r>
+              <a:rPr lang="en-US" dirty="0"/>
+              <a:t>They don’t seek care until more severe issues arise.</a:t>
+            </a:r>
+          </a:p>
+          <a:p>
+            <a:r>
+              <a:rPr lang="en-US" dirty="0"/>
+              <a:t>So ironically, “asymptomatic” in this case doesn’t mean healthy — it may actually </a:t>
+            </a:r>
+            <a:r>
+              <a:rPr lang="en-US" b="1" dirty="0"/>
+              <a:t>signal a higher risk</a:t>
+            </a:r>
+            <a:r>
+              <a:rPr lang="en-US" dirty="0"/>
+              <a:t> if the disease progresses undetected.</a:t>
+            </a:r>
           </a:p>
           <a:p>
             <a:endParaRPr dirty="0"/>
@@ -24236,7 +24262,7 @@
           <a:p>
             <a:r>
               <a:rPr lang="en-US" dirty="0"/>
-              <a:t>The overall accuracy of the model was 73%. A bit less than the 75% threshold.</a:t>
+              <a:t>The overall accuracy of the model was 70%. A bit less than the 75% threshold.</a:t>
             </a:r>
           </a:p>
           <a:p>

</xml_diff>